<commit_message>
addition of elements in CQL section
</commit_message>
<xml_diff>
--- a/img/src/rows.pptx
+++ b/img/src/rows.pptx
@@ -290,7 +290,7 @@
           <a:p>
             <a:fld id="{BB2ABD67-7658-4CB5-A3DE-E10C3E37DD68}" type="datetimeFigureOut">
               <a:rPr lang="fr-FR" smtClean="0"/>
-              <a:t>12/09/2018</a:t>
+              <a:t>17/09/2018</a:t>
             </a:fld>
             <a:endParaRPr lang="fr-FR"/>
           </a:p>
@@ -460,7 +460,7 @@
           <a:p>
             <a:fld id="{BB2ABD67-7658-4CB5-A3DE-E10C3E37DD68}" type="datetimeFigureOut">
               <a:rPr lang="fr-FR" smtClean="0"/>
-              <a:t>12/09/2018</a:t>
+              <a:t>17/09/2018</a:t>
             </a:fld>
             <a:endParaRPr lang="fr-FR"/>
           </a:p>
@@ -640,7 +640,7 @@
           <a:p>
             <a:fld id="{BB2ABD67-7658-4CB5-A3DE-E10C3E37DD68}" type="datetimeFigureOut">
               <a:rPr lang="fr-FR" smtClean="0"/>
-              <a:t>12/09/2018</a:t>
+              <a:t>17/09/2018</a:t>
             </a:fld>
             <a:endParaRPr lang="fr-FR"/>
           </a:p>
@@ -810,7 +810,7 @@
           <a:p>
             <a:fld id="{BB2ABD67-7658-4CB5-A3DE-E10C3E37DD68}" type="datetimeFigureOut">
               <a:rPr lang="fr-FR" smtClean="0"/>
-              <a:t>12/09/2018</a:t>
+              <a:t>17/09/2018</a:t>
             </a:fld>
             <a:endParaRPr lang="fr-FR"/>
           </a:p>
@@ -1056,7 +1056,7 @@
           <a:p>
             <a:fld id="{BB2ABD67-7658-4CB5-A3DE-E10C3E37DD68}" type="datetimeFigureOut">
               <a:rPr lang="fr-FR" smtClean="0"/>
-              <a:t>12/09/2018</a:t>
+              <a:t>17/09/2018</a:t>
             </a:fld>
             <a:endParaRPr lang="fr-FR"/>
           </a:p>
@@ -1344,7 +1344,7 @@
           <a:p>
             <a:fld id="{BB2ABD67-7658-4CB5-A3DE-E10C3E37DD68}" type="datetimeFigureOut">
               <a:rPr lang="fr-FR" smtClean="0"/>
-              <a:t>12/09/2018</a:t>
+              <a:t>17/09/2018</a:t>
             </a:fld>
             <a:endParaRPr lang="fr-FR"/>
           </a:p>
@@ -1766,7 +1766,7 @@
           <a:p>
             <a:fld id="{BB2ABD67-7658-4CB5-A3DE-E10C3E37DD68}" type="datetimeFigureOut">
               <a:rPr lang="fr-FR" smtClean="0"/>
-              <a:t>12/09/2018</a:t>
+              <a:t>17/09/2018</a:t>
             </a:fld>
             <a:endParaRPr lang="fr-FR"/>
           </a:p>
@@ -1884,7 +1884,7 @@
           <a:p>
             <a:fld id="{BB2ABD67-7658-4CB5-A3DE-E10C3E37DD68}" type="datetimeFigureOut">
               <a:rPr lang="fr-FR" smtClean="0"/>
-              <a:t>12/09/2018</a:t>
+              <a:t>17/09/2018</a:t>
             </a:fld>
             <a:endParaRPr lang="fr-FR"/>
           </a:p>
@@ -1979,7 +1979,7 @@
           <a:p>
             <a:fld id="{BB2ABD67-7658-4CB5-A3DE-E10C3E37DD68}" type="datetimeFigureOut">
               <a:rPr lang="fr-FR" smtClean="0"/>
-              <a:t>12/09/2018</a:t>
+              <a:t>17/09/2018</a:t>
             </a:fld>
             <a:endParaRPr lang="fr-FR"/>
           </a:p>
@@ -2256,7 +2256,7 @@
           <a:p>
             <a:fld id="{BB2ABD67-7658-4CB5-A3DE-E10C3E37DD68}" type="datetimeFigureOut">
               <a:rPr lang="fr-FR" smtClean="0"/>
-              <a:t>12/09/2018</a:t>
+              <a:t>17/09/2018</a:t>
             </a:fld>
             <a:endParaRPr lang="fr-FR"/>
           </a:p>
@@ -2509,7 +2509,7 @@
           <a:p>
             <a:fld id="{BB2ABD67-7658-4CB5-A3DE-E10C3E37DD68}" type="datetimeFigureOut">
               <a:rPr lang="fr-FR" smtClean="0"/>
-              <a:t>12/09/2018</a:t>
+              <a:t>17/09/2018</a:t>
             </a:fld>
             <a:endParaRPr lang="fr-FR"/>
           </a:p>
@@ -2722,7 +2722,7 @@
           <a:p>
             <a:fld id="{BB2ABD67-7658-4CB5-A3DE-E10C3E37DD68}" type="datetimeFigureOut">
               <a:rPr lang="fr-FR" smtClean="0"/>
-              <a:t>12/09/2018</a:t>
+              <a:t>17/09/2018</a:t>
             </a:fld>
             <a:endParaRPr lang="fr-FR"/>
           </a:p>
@@ -8184,8 +8184,8 @@
           <a:p>
             <a:pPr algn="ctr"/>
             <a:r>
-              <a:rPr lang="fr-FR" sz="1000" dirty="0" smtClean="0"/>
-              <a:t>201811091600:pressure</a:t>
+              <a:rPr lang="fr-FR" sz="1000" dirty="0"/>
+              <a:t>201809111600:pressure</a:t>
             </a:r>
             <a:endParaRPr lang="fr-FR" sz="1000" dirty="0"/>
           </a:p>
@@ -8566,7 +8566,7 @@
             <a:pPr algn="ctr"/>
             <a:r>
               <a:rPr lang="fr-FR" sz="1000" dirty="0" smtClean="0"/>
-              <a:t>201811091600:temp</a:t>
+              <a:t>201809111600:temp</a:t>
             </a:r>
             <a:endParaRPr lang="fr-FR" sz="1000" dirty="0"/>
           </a:p>
@@ -10393,8 +10393,8 @@
           <a:p>
             <a:pPr algn="ctr"/>
             <a:r>
-              <a:rPr lang="fr-FR" sz="1000" dirty="0" smtClean="0"/>
-              <a:t>201811091700:pressure</a:t>
+              <a:rPr lang="fr-FR" sz="1000" dirty="0"/>
+              <a:t>201809111700:pressure</a:t>
             </a:r>
             <a:endParaRPr lang="fr-FR" sz="1000" dirty="0"/>
           </a:p>
@@ -10774,8 +10774,8 @@
           <a:p>
             <a:pPr algn="ctr"/>
             <a:r>
-              <a:rPr lang="fr-FR" sz="1000" dirty="0" smtClean="0"/>
-              <a:t>201811091700:temp</a:t>
+              <a:rPr lang="fr-FR" sz="1000" dirty="0"/>
+              <a:t>201809111700:temp</a:t>
             </a:r>
             <a:endParaRPr lang="fr-FR" sz="1000" dirty="0"/>
           </a:p>

</xml_diff>